<commit_message>
Fix FlowChat and PPT
2017.07.24
</commit_message>
<xml_diff>
--- a/PPT Data/TheTeamA(07.18).pptx
+++ b/PPT Data/TheTeamA(07.18).pptx
@@ -234,7 +234,7 @@
             <a:fld id="{C78CF51F-BA5E-426D-B7CB-6141A61391D5}" type="datetimeFigureOut">
               <a:rPr lang="ko-KR" altLang="en-US" smtClean="0"/>
               <a:pPr/>
-              <a:t>2017-07-19</a:t>
+              <a:t>2017-07-24</a:t>
             </a:fld>
             <a:endParaRPr lang="ko-KR" altLang="en-US" dirty="0"/>
           </a:p>
@@ -2243,7 +2243,7 @@
             <a:fld id="{C601ED54-6771-4210-A2F1-2103A4BA9F53}" type="datetimeFigureOut">
               <a:rPr lang="ko-KR" altLang="en-US" smtClean="0"/>
               <a:pPr/>
-              <a:t>2017-07-19</a:t>
+              <a:t>2017-07-24</a:t>
             </a:fld>
             <a:endParaRPr lang="ko-KR" altLang="en-US" dirty="0"/>
           </a:p>
@@ -2415,7 +2415,7 @@
             <a:fld id="{C601ED54-6771-4210-A2F1-2103A4BA9F53}" type="datetimeFigureOut">
               <a:rPr lang="ko-KR" altLang="en-US" smtClean="0"/>
               <a:pPr/>
-              <a:t>2017-07-19</a:t>
+              <a:t>2017-07-24</a:t>
             </a:fld>
             <a:endParaRPr lang="ko-KR" altLang="en-US" dirty="0"/>
           </a:p>
@@ -2597,7 +2597,7 @@
             <a:fld id="{C601ED54-6771-4210-A2F1-2103A4BA9F53}" type="datetimeFigureOut">
               <a:rPr lang="ko-KR" altLang="en-US" smtClean="0"/>
               <a:pPr/>
-              <a:t>2017-07-19</a:t>
+              <a:t>2017-07-24</a:t>
             </a:fld>
             <a:endParaRPr lang="ko-KR" altLang="en-US" dirty="0"/>
           </a:p>
@@ -2769,7 +2769,7 @@
             <a:fld id="{C601ED54-6771-4210-A2F1-2103A4BA9F53}" type="datetimeFigureOut">
               <a:rPr lang="ko-KR" altLang="en-US" smtClean="0"/>
               <a:pPr/>
-              <a:t>2017-07-19</a:t>
+              <a:t>2017-07-24</a:t>
             </a:fld>
             <a:endParaRPr lang="ko-KR" altLang="en-US" dirty="0"/>
           </a:p>
@@ -3017,7 +3017,7 @@
             <a:fld id="{C601ED54-6771-4210-A2F1-2103A4BA9F53}" type="datetimeFigureOut">
               <a:rPr lang="ko-KR" altLang="en-US" smtClean="0"/>
               <a:pPr/>
-              <a:t>2017-07-19</a:t>
+              <a:t>2017-07-24</a:t>
             </a:fld>
             <a:endParaRPr lang="ko-KR" altLang="en-US" dirty="0"/>
           </a:p>
@@ -3307,7 +3307,7 @@
             <a:fld id="{C601ED54-6771-4210-A2F1-2103A4BA9F53}" type="datetimeFigureOut">
               <a:rPr lang="ko-KR" altLang="en-US" smtClean="0"/>
               <a:pPr/>
-              <a:t>2017-07-19</a:t>
+              <a:t>2017-07-24</a:t>
             </a:fld>
             <a:endParaRPr lang="ko-KR" altLang="en-US" dirty="0"/>
           </a:p>
@@ -3736,7 +3736,7 @@
             <a:fld id="{C601ED54-6771-4210-A2F1-2103A4BA9F53}" type="datetimeFigureOut">
               <a:rPr lang="ko-KR" altLang="en-US" smtClean="0"/>
               <a:pPr/>
-              <a:t>2017-07-19</a:t>
+              <a:t>2017-07-24</a:t>
             </a:fld>
             <a:endParaRPr lang="ko-KR" altLang="en-US" dirty="0"/>
           </a:p>
@@ -3856,7 +3856,7 @@
             <a:fld id="{C601ED54-6771-4210-A2F1-2103A4BA9F53}" type="datetimeFigureOut">
               <a:rPr lang="ko-KR" altLang="en-US" smtClean="0"/>
               <a:pPr/>
-              <a:t>2017-07-19</a:t>
+              <a:t>2017-07-24</a:t>
             </a:fld>
             <a:endParaRPr lang="ko-KR" altLang="en-US" dirty="0"/>
           </a:p>
@@ -3953,7 +3953,7 @@
             <a:fld id="{C601ED54-6771-4210-A2F1-2103A4BA9F53}" type="datetimeFigureOut">
               <a:rPr lang="ko-KR" altLang="en-US" smtClean="0"/>
               <a:pPr/>
-              <a:t>2017-07-19</a:t>
+              <a:t>2017-07-24</a:t>
             </a:fld>
             <a:endParaRPr lang="ko-KR" altLang="en-US" dirty="0"/>
           </a:p>
@@ -4232,7 +4232,7 @@
             <a:fld id="{C601ED54-6771-4210-A2F1-2103A4BA9F53}" type="datetimeFigureOut">
               <a:rPr lang="ko-KR" altLang="en-US" smtClean="0"/>
               <a:pPr/>
-              <a:t>2017-07-19</a:t>
+              <a:t>2017-07-24</a:t>
             </a:fld>
             <a:endParaRPr lang="ko-KR" altLang="en-US" dirty="0"/>
           </a:p>
@@ -4487,7 +4487,7 @@
             <a:fld id="{C601ED54-6771-4210-A2F1-2103A4BA9F53}" type="datetimeFigureOut">
               <a:rPr lang="ko-KR" altLang="en-US" smtClean="0"/>
               <a:pPr/>
-              <a:t>2017-07-19</a:t>
+              <a:t>2017-07-24</a:t>
             </a:fld>
             <a:endParaRPr lang="ko-KR" altLang="en-US" dirty="0"/>
           </a:p>
@@ -4702,7 +4702,7 @@
             <a:fld id="{C601ED54-6771-4210-A2F1-2103A4BA9F53}" type="datetimeFigureOut">
               <a:rPr lang="ko-KR" altLang="en-US" smtClean="0"/>
               <a:pPr/>
-              <a:t>2017-07-19</a:t>
+              <a:t>2017-07-24</a:t>
             </a:fld>
             <a:endParaRPr lang="ko-KR" altLang="en-US" dirty="0"/>
           </a:p>
@@ -14503,146 +14503,6 @@
         </p:sp>
         <p:sp>
           <p:nvSpPr>
-            <p:cNvPr id="28" name="직사각형 27"/>
-            <p:cNvSpPr/>
-            <p:nvPr/>
-          </p:nvSpPr>
-          <p:spPr>
-            <a:xfrm>
-              <a:off x="5179092" y="1378686"/>
-              <a:ext cx="2266561" cy="1954527"/>
-            </a:xfrm>
-            <a:prstGeom prst="rect">
-              <a:avLst/>
-            </a:prstGeom>
-            <a:noFill/>
-            <a:ln w="19050">
-              <a:solidFill>
-                <a:schemeClr val="tx1"/>
-              </a:solidFill>
-            </a:ln>
-          </p:spPr>
-          <p:style>
-            <a:lnRef idx="2">
-              <a:schemeClr val="accent1">
-                <a:shade val="50000"/>
-              </a:schemeClr>
-            </a:lnRef>
-            <a:fillRef idx="1">
-              <a:schemeClr val="accent1"/>
-            </a:fillRef>
-            <a:effectRef idx="0">
-              <a:schemeClr val="accent1"/>
-            </a:effectRef>
-            <a:fontRef idx="minor">
-              <a:schemeClr val="lt1"/>
-            </a:fontRef>
-          </p:style>
-          <p:txBody>
-            <a:bodyPr rtlCol="0" anchor="ctr"/>
-            <a:lstStyle/>
-            <a:p>
-              <a:pPr marL="342900" indent="-342900"/>
-              <a:r>
-                <a:rPr lang="en-US" altLang="ko-KR" sz="1200" dirty="0" smtClean="0">
-                  <a:solidFill>
-                    <a:schemeClr val="tx1"/>
-                  </a:solidFill>
-                </a:rPr>
-                <a:t>   - Device Enrollment</a:t>
-              </a:r>
-            </a:p>
-            <a:p>
-              <a:pPr marL="342900" indent="-342900"/>
-              <a:r>
-                <a:rPr lang="en-US" altLang="ko-KR" sz="1200" dirty="0" smtClean="0">
-                  <a:solidFill>
-                    <a:schemeClr val="tx1"/>
-                  </a:solidFill>
-                </a:rPr>
-                <a:t>   - Device Release</a:t>
-              </a:r>
-            </a:p>
-            <a:p>
-              <a:pPr marL="342900" indent="-342900"/>
-              <a:r>
-                <a:rPr lang="en-US" altLang="ko-KR" sz="1200" dirty="0" smtClean="0">
-                  <a:solidFill>
-                    <a:schemeClr val="tx1"/>
-                  </a:solidFill>
-                </a:rPr>
-                <a:t>   </a:t>
-              </a:r>
-              <a:endParaRPr lang="ko-KR" altLang="en-US" sz="1200" dirty="0">
-                <a:solidFill>
-                  <a:schemeClr val="tx1"/>
-                </a:solidFill>
-              </a:endParaRPr>
-            </a:p>
-          </p:txBody>
-        </p:sp>
-        <p:sp>
-          <p:nvSpPr>
-            <p:cNvPr id="29" name="직사각형 28"/>
-            <p:cNvSpPr/>
-            <p:nvPr/>
-          </p:nvSpPr>
-          <p:spPr>
-            <a:xfrm>
-              <a:off x="5344452" y="1118338"/>
-              <a:ext cx="1883042" cy="385503"/>
-            </a:xfrm>
-            <a:prstGeom prst="rect">
-              <a:avLst/>
-            </a:prstGeom>
-            <a:solidFill>
-              <a:schemeClr val="bg1"/>
-            </a:solidFill>
-            <a:ln w="19050">
-              <a:solidFill>
-                <a:schemeClr val="tx1"/>
-              </a:solidFill>
-            </a:ln>
-          </p:spPr>
-          <p:style>
-            <a:lnRef idx="2">
-              <a:schemeClr val="accent1">
-                <a:shade val="50000"/>
-              </a:schemeClr>
-            </a:lnRef>
-            <a:fillRef idx="1">
-              <a:schemeClr val="accent1"/>
-            </a:fillRef>
-            <a:effectRef idx="0">
-              <a:schemeClr val="accent1"/>
-            </a:effectRef>
-            <a:fontRef idx="minor">
-              <a:schemeClr val="lt1"/>
-            </a:fontRef>
-          </p:style>
-          <p:txBody>
-            <a:bodyPr rtlCol="0" anchor="ctr"/>
-            <a:lstStyle/>
-            <a:p>
-              <a:pPr algn="ctr"/>
-              <a:r>
-                <a:rPr lang="en-US" altLang="ko-KR" sz="1400" dirty="0" smtClean="0">
-                  <a:solidFill>
-                    <a:schemeClr val="tx1"/>
-                  </a:solidFill>
-                </a:rPr>
-                <a:t>Sensor Management</a:t>
-              </a:r>
-              <a:endParaRPr lang="ko-KR" altLang="en-US" sz="1400" dirty="0">
-                <a:solidFill>
-                  <a:schemeClr val="tx1"/>
-                </a:solidFill>
-              </a:endParaRPr>
-            </a:p>
-          </p:txBody>
-        </p:sp>
-        <p:sp>
-          <p:nvSpPr>
             <p:cNvPr id="30" name="직사각형 29"/>
             <p:cNvSpPr/>
             <p:nvPr/>
@@ -14702,16 +14562,7 @@
                   </a:solidFill>
                   <a:latin typeface="+mj-lt"/>
                 </a:rPr>
-                <a:t>   - </a:t>
-              </a:r>
-              <a:r>
-                <a:rPr lang="en-US" altLang="ko-KR" sz="1200" dirty="0" smtClean="0">
-                  <a:solidFill>
-                    <a:schemeClr val="tx1"/>
-                  </a:solidFill>
-                  <a:latin typeface="+mj-lt"/>
-                </a:rPr>
-                <a:t>Real-time</a:t>
+                <a:t>   - Real-time</a:t>
               </a:r>
               <a:r>
                 <a:rPr lang="ko-KR" altLang="en-US" sz="1200" dirty="0" smtClean="0">
@@ -14848,15 +14699,7 @@
                     <a:schemeClr val="tx1"/>
                   </a:solidFill>
                 </a:rPr>
-                <a:t>   - Display </a:t>
-              </a:r>
-              <a:r>
-                <a:rPr lang="en-US" altLang="ko-KR" sz="1200" dirty="0" smtClean="0">
-                  <a:solidFill>
-                    <a:schemeClr val="tx1"/>
-                  </a:solidFill>
-                </a:rPr>
-                <a:t>Data</a:t>
+                <a:t>   - Display Data</a:t>
               </a:r>
             </a:p>
             <a:p>
@@ -14883,24 +14726,21 @@
                     <a:schemeClr val="tx1"/>
                   </a:solidFill>
                 </a:rPr>
-                <a:t>Filtering Data</a:t>
+                <a:t>Filtering </a:t>
+              </a:r>
+              <a:r>
+                <a:rPr lang="en-US" altLang="ko-KR" sz="1200" dirty="0" smtClean="0">
+                  <a:solidFill>
+                    <a:schemeClr val="tx1"/>
+                  </a:solidFill>
+                </a:rPr>
+                <a:t>Data</a:t>
               </a:r>
               <a:endParaRPr lang="en-US" altLang="ko-KR" sz="1200" dirty="0" smtClean="0">
                 <a:solidFill>
                   <a:schemeClr val="tx1"/>
                 </a:solidFill>
               </a:endParaRPr>
-            </a:p>
-            <a:p>
-              <a:pPr marL="342900" indent="-342900"/>
-              <a:r>
-                <a:rPr lang="en-US" altLang="ko-KR" sz="1200" dirty="0" smtClean="0">
-                  <a:solidFill>
-                    <a:schemeClr val="tx1"/>
-                  </a:solidFill>
-                </a:rPr>
-                <a:t>   - Real-time Display Data</a:t>
-              </a:r>
             </a:p>
           </p:txBody>
         </p:sp>
@@ -14973,7 +14813,7 @@
           <p:spPr>
             <a:xfrm>
               <a:off x="2707758" y="1378686"/>
-              <a:ext cx="2266561" cy="1954527"/>
+              <a:ext cx="4737895" cy="1954526"/>
             </a:xfrm>
             <a:prstGeom prst="rect">
               <a:avLst/>
@@ -15151,7 +14991,7 @@
           </p:nvSpPr>
           <p:spPr>
             <a:xfrm>
-              <a:off x="2968911" y="1118338"/>
+              <a:off x="4224306" y="1172310"/>
               <a:ext cx="1704798" cy="450759"/>
             </a:xfrm>
             <a:prstGeom prst="rect">

</xml_diff>